<commit_message>
spec updates for data augmentation
</commit_message>
<xml_diff>
--- a/train/Roadmap - Gap 1.0.pptx
+++ b/train/Roadmap - Gap 1.0.pptx
@@ -198,7 +198,7 @@
           <a:p>
             <a:fld id="{FAF957FC-5175-49AC-8D2B-2F056FFFC1DD}" type="datetimeFigureOut">
               <a:rPr lang="en-US" smtClean="0"/>
-              <a:t>7/26/2018</a:t>
+              <a:t>8/9/2018</a:t>
             </a:fld>
             <a:endParaRPr lang="en-US"/>
           </a:p>
@@ -648,7 +648,7 @@
             <a:fld id="{1D8BD707-D9CF-40AE-B4C6-C98DA3205C09}" type="datetimeFigureOut">
               <a:rPr lang="en-US" smtClean="0"/>
               <a:pPr/>
-              <a:t>7/26/2018</a:t>
+              <a:t>8/9/2018</a:t>
             </a:fld>
             <a:endParaRPr lang="en-US"/>
           </a:p>
@@ -815,7 +815,7 @@
             <a:fld id="{1D8BD707-D9CF-40AE-B4C6-C98DA3205C09}" type="datetimeFigureOut">
               <a:rPr lang="en-US" smtClean="0"/>
               <a:pPr/>
-              <a:t>7/26/2018</a:t>
+              <a:t>8/9/2018</a:t>
             </a:fld>
             <a:endParaRPr lang="en-US"/>
           </a:p>
@@ -992,7 +992,7 @@
             <a:fld id="{1D8BD707-D9CF-40AE-B4C6-C98DA3205C09}" type="datetimeFigureOut">
               <a:rPr lang="en-US" smtClean="0"/>
               <a:pPr/>
-              <a:t>7/26/2018</a:t>
+              <a:t>8/9/2018</a:t>
             </a:fld>
             <a:endParaRPr lang="en-US"/>
           </a:p>
@@ -1159,7 +1159,7 @@
             <a:fld id="{1D8BD707-D9CF-40AE-B4C6-C98DA3205C09}" type="datetimeFigureOut">
               <a:rPr lang="en-US" smtClean="0"/>
               <a:pPr/>
-              <a:t>7/26/2018</a:t>
+              <a:t>8/9/2018</a:t>
             </a:fld>
             <a:endParaRPr lang="en-US"/>
           </a:p>
@@ -1402,7 +1402,7 @@
             <a:fld id="{1D8BD707-D9CF-40AE-B4C6-C98DA3205C09}" type="datetimeFigureOut">
               <a:rPr lang="en-US" smtClean="0"/>
               <a:pPr/>
-              <a:t>7/26/2018</a:t>
+              <a:t>8/9/2018</a:t>
             </a:fld>
             <a:endParaRPr lang="en-US"/>
           </a:p>
@@ -1687,7 +1687,7 @@
             <a:fld id="{1D8BD707-D9CF-40AE-B4C6-C98DA3205C09}" type="datetimeFigureOut">
               <a:rPr lang="en-US" smtClean="0"/>
               <a:pPr/>
-              <a:t>7/26/2018</a:t>
+              <a:t>8/9/2018</a:t>
             </a:fld>
             <a:endParaRPr lang="en-US"/>
           </a:p>
@@ -2106,7 +2106,7 @@
             <a:fld id="{1D8BD707-D9CF-40AE-B4C6-C98DA3205C09}" type="datetimeFigureOut">
               <a:rPr lang="en-US" smtClean="0"/>
               <a:pPr/>
-              <a:t>7/26/2018</a:t>
+              <a:t>8/9/2018</a:t>
             </a:fld>
             <a:endParaRPr lang="en-US"/>
           </a:p>
@@ -2221,7 +2221,7 @@
             <a:fld id="{1D8BD707-D9CF-40AE-B4C6-C98DA3205C09}" type="datetimeFigureOut">
               <a:rPr lang="en-US" smtClean="0"/>
               <a:pPr/>
-              <a:t>7/26/2018</a:t>
+              <a:t>8/9/2018</a:t>
             </a:fld>
             <a:endParaRPr lang="en-US"/>
           </a:p>
@@ -2313,7 +2313,7 @@
             <a:fld id="{1D8BD707-D9CF-40AE-B4C6-C98DA3205C09}" type="datetimeFigureOut">
               <a:rPr lang="en-US" smtClean="0"/>
               <a:pPr/>
-              <a:t>7/26/2018</a:t>
+              <a:t>8/9/2018</a:t>
             </a:fld>
             <a:endParaRPr lang="en-US"/>
           </a:p>
@@ -2587,7 +2587,7 @@
             <a:fld id="{1D8BD707-D9CF-40AE-B4C6-C98DA3205C09}" type="datetimeFigureOut">
               <a:rPr lang="en-US" smtClean="0"/>
               <a:pPr/>
-              <a:t>7/26/2018</a:t>
+              <a:t>8/9/2018</a:t>
             </a:fld>
             <a:endParaRPr lang="en-US"/>
           </a:p>
@@ -2837,7 +2837,7 @@
             <a:fld id="{1D8BD707-D9CF-40AE-B4C6-C98DA3205C09}" type="datetimeFigureOut">
               <a:rPr lang="en-US" smtClean="0"/>
               <a:pPr/>
-              <a:t>7/26/2018</a:t>
+              <a:t>8/9/2018</a:t>
             </a:fld>
             <a:endParaRPr lang="en-US"/>
           </a:p>
@@ -3047,7 +3047,7 @@
             <a:fld id="{1D8BD707-D9CF-40AE-B4C6-C98DA3205C09}" type="datetimeFigureOut">
               <a:rPr lang="en-US" smtClean="0"/>
               <a:pPr/>
-              <a:t>7/26/2018</a:t>
+              <a:t>8/9/2018</a:t>
             </a:fld>
             <a:endParaRPr lang="en-US"/>
           </a:p>
@@ -11734,13 +11734,6 @@
               </a:rPr>
               <a:t>ML Ready Data - Retrieval</a:t>
             </a:r>
-            <a:endParaRPr lang="en-US" sz="2400" b="1" dirty="0" smtClean="0">
-              <a:solidFill>
-                <a:schemeClr val="accent5">
-                  <a:lumMod val="75000"/>
-                </a:schemeClr>
-              </a:solidFill>
-            </a:endParaRPr>
           </a:p>
         </p:txBody>
       </p:sp>
@@ -12221,7 +12214,6 @@
               <a:rPr lang="en-US" sz="1600" dirty="0" smtClean="0"/>
               <a:t>BATCH</a:t>
             </a:r>
-            <a:endParaRPr lang="en-US" sz="1600" dirty="0" smtClean="0"/>
           </a:p>
         </p:txBody>
       </p:sp>
@@ -12503,8 +12495,8 @@
           <a:p>
             <a:pPr algn="ctr"/>
             <a:r>
-              <a:rPr lang="en-US" dirty="0" smtClean="0"/>
-              <a:t>Synthesis</a:t>
+              <a:rPr lang="en-US" smtClean="0"/>
+              <a:t>Augmentation</a:t>
             </a:r>
             <a:r>
               <a:rPr lang="en-US" dirty="0" smtClean="0"/>
@@ -12722,10 +12714,6 @@
             <a:r>
               <a:rPr lang="en-US" dirty="0" smtClean="0"/>
               <a:t>Transform</a:t>
-            </a:r>
-            <a:r>
-              <a:rPr lang="en-US" dirty="0" smtClean="0"/>
-              <a:t/>
             </a:r>
             <a:br>
               <a:rPr lang="en-US" dirty="0" smtClean="0"/>

</xml_diff>